<commit_message>
Doc edits per conversations with Troy A.
</commit_message>
<xml_diff>
--- a/docs/deployment_guide/images/amc-architecture-diagrams.pptx
+++ b/docs/deployment_guide/images/amc-architecture-diagrams.pptx
@@ -218,7 +218,7 @@
           <a:p>
             <a:fld id="{DEC0E4F8-FC9B-C74A-97AB-66A417AA65A9}" type="datetimeFigureOut">
               <a:rPr lang="en-US" smtClean="0"/>
-              <a:t>5/16/2022</a:t>
+              <a:t>5/19/2022</a:t>
             </a:fld>
             <a:endParaRPr lang="en-US"/>
           </a:p>
@@ -1209,7 +1209,7 @@
           <a:p>
             <a:fld id="{B60C387C-249C-E74C-AA9C-592306AF9B93}" type="datetimeFigureOut">
               <a:rPr lang="en-US" smtClean="0"/>
-              <a:t>5/16/2022</a:t>
+              <a:t>5/19/2022</a:t>
             </a:fld>
             <a:endParaRPr lang="en-US"/>
           </a:p>
@@ -1379,7 +1379,7 @@
           <a:p>
             <a:fld id="{B60C387C-249C-E74C-AA9C-592306AF9B93}" type="datetimeFigureOut">
               <a:rPr lang="en-US" smtClean="0"/>
-              <a:t>5/16/2022</a:t>
+              <a:t>5/19/2022</a:t>
             </a:fld>
             <a:endParaRPr lang="en-US"/>
           </a:p>
@@ -1559,7 +1559,7 @@
           <a:p>
             <a:fld id="{B60C387C-249C-E74C-AA9C-592306AF9B93}" type="datetimeFigureOut">
               <a:rPr lang="en-US" smtClean="0"/>
-              <a:t>5/16/2022</a:t>
+              <a:t>5/19/2022</a:t>
             </a:fld>
             <a:endParaRPr lang="en-US"/>
           </a:p>
@@ -1861,7 +1861,7 @@
           <a:p>
             <a:fld id="{B60C387C-249C-E74C-AA9C-592306AF9B93}" type="datetimeFigureOut">
               <a:rPr lang="en-US" smtClean="0"/>
-              <a:t>5/16/2022</a:t>
+              <a:t>5/19/2022</a:t>
             </a:fld>
             <a:endParaRPr lang="en-US"/>
           </a:p>
@@ -2107,7 +2107,7 @@
           <a:p>
             <a:fld id="{B60C387C-249C-E74C-AA9C-592306AF9B93}" type="datetimeFigureOut">
               <a:rPr lang="en-US" smtClean="0"/>
-              <a:t>5/16/2022</a:t>
+              <a:t>5/19/2022</a:t>
             </a:fld>
             <a:endParaRPr lang="en-US"/>
           </a:p>
@@ -2339,7 +2339,7 @@
           <a:p>
             <a:fld id="{B60C387C-249C-E74C-AA9C-592306AF9B93}" type="datetimeFigureOut">
               <a:rPr lang="en-US" smtClean="0"/>
-              <a:t>5/16/2022</a:t>
+              <a:t>5/19/2022</a:t>
             </a:fld>
             <a:endParaRPr lang="en-US"/>
           </a:p>
@@ -2706,7 +2706,7 @@
           <a:p>
             <a:fld id="{B60C387C-249C-E74C-AA9C-592306AF9B93}" type="datetimeFigureOut">
               <a:rPr lang="en-US" smtClean="0"/>
-              <a:t>5/16/2022</a:t>
+              <a:t>5/19/2022</a:t>
             </a:fld>
             <a:endParaRPr lang="en-US"/>
           </a:p>
@@ -2824,7 +2824,7 @@
           <a:p>
             <a:fld id="{B60C387C-249C-E74C-AA9C-592306AF9B93}" type="datetimeFigureOut">
               <a:rPr lang="en-US" smtClean="0"/>
-              <a:t>5/16/2022</a:t>
+              <a:t>5/19/2022</a:t>
             </a:fld>
             <a:endParaRPr lang="en-US"/>
           </a:p>
@@ -2919,7 +2919,7 @@
           <a:p>
             <a:fld id="{B60C387C-249C-E74C-AA9C-592306AF9B93}" type="datetimeFigureOut">
               <a:rPr lang="en-US" smtClean="0"/>
-              <a:t>5/16/2022</a:t>
+              <a:t>5/19/2022</a:t>
             </a:fld>
             <a:endParaRPr lang="en-US"/>
           </a:p>
@@ -3196,7 +3196,7 @@
           <a:p>
             <a:fld id="{B60C387C-249C-E74C-AA9C-592306AF9B93}" type="datetimeFigureOut">
               <a:rPr lang="en-US" smtClean="0"/>
-              <a:t>5/16/2022</a:t>
+              <a:t>5/19/2022</a:t>
             </a:fld>
             <a:endParaRPr lang="en-US"/>
           </a:p>
@@ -3453,7 +3453,7 @@
           <a:p>
             <a:fld id="{B60C387C-249C-E74C-AA9C-592306AF9B93}" type="datetimeFigureOut">
               <a:rPr lang="en-US" smtClean="0"/>
-              <a:t>5/16/2022</a:t>
+              <a:t>5/19/2022</a:t>
             </a:fld>
             <a:endParaRPr lang="en-US"/>
           </a:p>
@@ -3666,7 +3666,7 @@
           <a:p>
             <a:fld id="{B60C387C-249C-E74C-AA9C-592306AF9B93}" type="datetimeFigureOut">
               <a:rPr lang="en-US" smtClean="0"/>
-              <a:t>5/16/2022</a:t>
+              <a:t>5/19/2022</a:t>
             </a:fld>
             <a:endParaRPr lang="en-US"/>
           </a:p>
@@ -5372,8 +5372,8 @@
         </p:nvSpPr>
         <p:spPr bwMode="auto">
           <a:xfrm>
-            <a:off x="15494475" y="4746683"/>
-            <a:ext cx="1073150" cy="261610"/>
+            <a:off x="15662115" y="4746683"/>
+            <a:ext cx="711075" cy="261610"/>
           </a:xfrm>
           <a:prstGeom prst="rect">
             <a:avLst/>
@@ -5403,7 +5403,7 @@
           </a:extLst>
         </p:spPr>
         <p:txBody>
-          <a:bodyPr>
+          <a:bodyPr wrap="square">
             <a:spAutoFit/>
           </a:bodyPr>
           <a:lstStyle>
@@ -5593,8 +5593,8 @@
         </p:nvSpPr>
         <p:spPr bwMode="auto">
           <a:xfrm>
-            <a:off x="15494475" y="6392920"/>
-            <a:ext cx="1073150" cy="430887"/>
+            <a:off x="15532575" y="6392920"/>
+            <a:ext cx="980451" cy="430887"/>
           </a:xfrm>
           <a:prstGeom prst="rect">
             <a:avLst/>

</xml_diff>

<commit_message>
Edits per Clark Fredricksen
</commit_message>
<xml_diff>
--- a/docs/deployment_guide/images/amc-architecture-diagrams.pptx
+++ b/docs/deployment_guide/images/amc-architecture-diagrams.pptx
@@ -218,7 +218,7 @@
           <a:p>
             <a:fld id="{DEC0E4F8-FC9B-C74A-97AB-66A417AA65A9}" type="datetimeFigureOut">
               <a:rPr lang="en-US" smtClean="0"/>
-              <a:t>5/19/2022</a:t>
+              <a:t>6/9/2022</a:t>
             </a:fld>
             <a:endParaRPr lang="en-US"/>
           </a:p>
@@ -1209,7 +1209,7 @@
           <a:p>
             <a:fld id="{B60C387C-249C-E74C-AA9C-592306AF9B93}" type="datetimeFigureOut">
               <a:rPr lang="en-US" smtClean="0"/>
-              <a:t>5/19/2022</a:t>
+              <a:t>6/9/2022</a:t>
             </a:fld>
             <a:endParaRPr lang="en-US"/>
           </a:p>
@@ -1379,7 +1379,7 @@
           <a:p>
             <a:fld id="{B60C387C-249C-E74C-AA9C-592306AF9B93}" type="datetimeFigureOut">
               <a:rPr lang="en-US" smtClean="0"/>
-              <a:t>5/19/2022</a:t>
+              <a:t>6/9/2022</a:t>
             </a:fld>
             <a:endParaRPr lang="en-US"/>
           </a:p>
@@ -1559,7 +1559,7 @@
           <a:p>
             <a:fld id="{B60C387C-249C-E74C-AA9C-592306AF9B93}" type="datetimeFigureOut">
               <a:rPr lang="en-US" smtClean="0"/>
-              <a:t>5/19/2022</a:t>
+              <a:t>6/9/2022</a:t>
             </a:fld>
             <a:endParaRPr lang="en-US"/>
           </a:p>
@@ -1861,7 +1861,7 @@
           <a:p>
             <a:fld id="{B60C387C-249C-E74C-AA9C-592306AF9B93}" type="datetimeFigureOut">
               <a:rPr lang="en-US" smtClean="0"/>
-              <a:t>5/19/2022</a:t>
+              <a:t>6/9/2022</a:t>
             </a:fld>
             <a:endParaRPr lang="en-US"/>
           </a:p>
@@ -2107,7 +2107,7 @@
           <a:p>
             <a:fld id="{B60C387C-249C-E74C-AA9C-592306AF9B93}" type="datetimeFigureOut">
               <a:rPr lang="en-US" smtClean="0"/>
-              <a:t>5/19/2022</a:t>
+              <a:t>6/9/2022</a:t>
             </a:fld>
             <a:endParaRPr lang="en-US"/>
           </a:p>
@@ -2339,7 +2339,7 @@
           <a:p>
             <a:fld id="{B60C387C-249C-E74C-AA9C-592306AF9B93}" type="datetimeFigureOut">
               <a:rPr lang="en-US" smtClean="0"/>
-              <a:t>5/19/2022</a:t>
+              <a:t>6/9/2022</a:t>
             </a:fld>
             <a:endParaRPr lang="en-US"/>
           </a:p>
@@ -2706,7 +2706,7 @@
           <a:p>
             <a:fld id="{B60C387C-249C-E74C-AA9C-592306AF9B93}" type="datetimeFigureOut">
               <a:rPr lang="en-US" smtClean="0"/>
-              <a:t>5/19/2022</a:t>
+              <a:t>6/9/2022</a:t>
             </a:fld>
             <a:endParaRPr lang="en-US"/>
           </a:p>
@@ -2824,7 +2824,7 @@
           <a:p>
             <a:fld id="{B60C387C-249C-E74C-AA9C-592306AF9B93}" type="datetimeFigureOut">
               <a:rPr lang="en-US" smtClean="0"/>
-              <a:t>5/19/2022</a:t>
+              <a:t>6/9/2022</a:t>
             </a:fld>
             <a:endParaRPr lang="en-US"/>
           </a:p>
@@ -2919,7 +2919,7 @@
           <a:p>
             <a:fld id="{B60C387C-249C-E74C-AA9C-592306AF9B93}" type="datetimeFigureOut">
               <a:rPr lang="en-US" smtClean="0"/>
-              <a:t>5/19/2022</a:t>
+              <a:t>6/9/2022</a:t>
             </a:fld>
             <a:endParaRPr lang="en-US"/>
           </a:p>
@@ -3196,7 +3196,7 @@
           <a:p>
             <a:fld id="{B60C387C-249C-E74C-AA9C-592306AF9B93}" type="datetimeFigureOut">
               <a:rPr lang="en-US" smtClean="0"/>
-              <a:t>5/19/2022</a:t>
+              <a:t>6/9/2022</a:t>
             </a:fld>
             <a:endParaRPr lang="en-US"/>
           </a:p>
@@ -3453,7 +3453,7 @@
           <a:p>
             <a:fld id="{B60C387C-249C-E74C-AA9C-592306AF9B93}" type="datetimeFigureOut">
               <a:rPr lang="en-US" smtClean="0"/>
-              <a:t>5/19/2022</a:t>
+              <a:t>6/9/2022</a:t>
             </a:fld>
             <a:endParaRPr lang="en-US"/>
           </a:p>
@@ -3666,7 +3666,7 @@
           <a:p>
             <a:fld id="{B60C387C-249C-E74C-AA9C-592306AF9B93}" type="datetimeFigureOut">
               <a:rPr lang="en-US" smtClean="0"/>
-              <a:t>5/19/2022</a:t>
+              <a:t>6/9/2022</a:t>
             </a:fld>
             <a:endParaRPr lang="en-US"/>
           </a:p>
@@ -4275,7 +4275,7 @@
                 <a:ea typeface="Amazon Ember" panose="020B0603020204020204" pitchFamily="34" charset="0"/>
                 <a:cs typeface="Arial" panose="020B0604020202020204" pitchFamily="34" charset="0"/>
               </a:rPr>
-              <a:t>S3 bucket for aggregate </a:t>
+              <a:t>S3 bucket for</a:t>
             </a:r>
             <a:br>
               <a:rPr lang="en-US" altLang="en-US" sz="1100" dirty="0">
@@ -4300,7 +4300,7 @@
                 <a:latin typeface="Arial" panose="020B0604020202020204" pitchFamily="34" charset="0"/>
                 <a:cs typeface="Arial" panose="020B0604020202020204" pitchFamily="34" charset="0"/>
               </a:rPr>
-              <a:t>data</a:t>
+              <a:t>query results</a:t>
             </a:r>
             <a:endParaRPr lang="en-US" altLang="en-US" sz="1100" dirty="0">
               <a:latin typeface="Arial" panose="020B0604020202020204" pitchFamily="34" charset="0"/>
@@ -7005,7 +7005,7 @@
         <p:spPr bwMode="auto">
           <a:xfrm>
             <a:off x="14397813" y="4759818"/>
-            <a:ext cx="1129688" cy="430887"/>
+            <a:ext cx="1129688" cy="600164"/>
           </a:xfrm>
           <a:prstGeom prst="rect">
             <a:avLst/>
@@ -7160,6 +7160,21 @@
                 <a:cs typeface="Arial" panose="020B0604020202020204" pitchFamily="34" charset="0"/>
               </a:rPr>
               <a:t>notebooks</a:t>
+            </a:r>
+            <a:br>
+              <a:rPr lang="en-US" altLang="en-US" sz="1100" dirty="0">
+                <a:latin typeface="Arial" panose="020B0604020202020204" pitchFamily="34" charset="0"/>
+                <a:ea typeface="Amazon Ember" panose="020B0603020204020204" pitchFamily="34" charset="0"/>
+                <a:cs typeface="Arial" panose="020B0604020202020204" pitchFamily="34" charset="0"/>
+              </a:rPr>
+            </a:br>
+            <a:r>
+              <a:rPr lang="en-US" altLang="en-US" sz="1100" dirty="0">
+                <a:latin typeface="Arial" panose="020B0604020202020204" pitchFamily="34" charset="0"/>
+                <a:ea typeface="Amazon Ember" panose="020B0603020204020204" pitchFamily="34" charset="0"/>
+                <a:cs typeface="Arial" panose="020B0604020202020204" pitchFamily="34" charset="0"/>
+              </a:rPr>
+              <a:t>(Optional)</a:t>
             </a:r>
           </a:p>
         </p:txBody>

</xml_diff>